<commit_message>
cập nhật silde báo cáo và chỉnh sửa giao diện trang chủ
</commit_message>
<xml_diff>
--- a/thesis/abs/Slide Báo Cáo CN.pptx
+++ b/thesis/abs/Slide Báo Cáo CN.pptx
@@ -269,7 +269,7 @@
           <a:p>
             <a:fld id="{BA4BB51B-3CD3-4CE1-ACE4-0E3A0E4CFD3F}" type="datetimeFigureOut">
               <a:rPr lang="en-US" smtClean="0"/>
-              <a:t>1/14/2025</a:t>
+              <a:t>1/15/2025</a:t>
             </a:fld>
             <a:endParaRPr lang="en-US"/>
           </a:p>
@@ -467,7 +467,7 @@
           <a:p>
             <a:fld id="{BA4BB51B-3CD3-4CE1-ACE4-0E3A0E4CFD3F}" type="datetimeFigureOut">
               <a:rPr lang="en-US" smtClean="0"/>
-              <a:t>1/14/2025</a:t>
+              <a:t>1/15/2025</a:t>
             </a:fld>
             <a:endParaRPr lang="en-US"/>
           </a:p>
@@ -675,7 +675,7 @@
           <a:p>
             <a:fld id="{BA4BB51B-3CD3-4CE1-ACE4-0E3A0E4CFD3F}" type="datetimeFigureOut">
               <a:rPr lang="en-US" smtClean="0"/>
-              <a:t>1/14/2025</a:t>
+              <a:t>1/15/2025</a:t>
             </a:fld>
             <a:endParaRPr lang="en-US"/>
           </a:p>
@@ -873,7 +873,7 @@
           <a:p>
             <a:fld id="{BA4BB51B-3CD3-4CE1-ACE4-0E3A0E4CFD3F}" type="datetimeFigureOut">
               <a:rPr lang="en-US" smtClean="0"/>
-              <a:t>1/14/2025</a:t>
+              <a:t>1/15/2025</a:t>
             </a:fld>
             <a:endParaRPr lang="en-US"/>
           </a:p>
@@ -1148,7 +1148,7 @@
           <a:p>
             <a:fld id="{BA4BB51B-3CD3-4CE1-ACE4-0E3A0E4CFD3F}" type="datetimeFigureOut">
               <a:rPr lang="en-US" smtClean="0"/>
-              <a:t>1/14/2025</a:t>
+              <a:t>1/15/2025</a:t>
             </a:fld>
             <a:endParaRPr lang="en-US"/>
           </a:p>
@@ -1413,7 +1413,7 @@
           <a:p>
             <a:fld id="{BA4BB51B-3CD3-4CE1-ACE4-0E3A0E4CFD3F}" type="datetimeFigureOut">
               <a:rPr lang="en-US" smtClean="0"/>
-              <a:t>1/14/2025</a:t>
+              <a:t>1/15/2025</a:t>
             </a:fld>
             <a:endParaRPr lang="en-US"/>
           </a:p>
@@ -1825,7 +1825,7 @@
           <a:p>
             <a:fld id="{BA4BB51B-3CD3-4CE1-ACE4-0E3A0E4CFD3F}" type="datetimeFigureOut">
               <a:rPr lang="en-US" smtClean="0"/>
-              <a:t>1/14/2025</a:t>
+              <a:t>1/15/2025</a:t>
             </a:fld>
             <a:endParaRPr lang="en-US"/>
           </a:p>
@@ -1966,7 +1966,7 @@
           <a:p>
             <a:fld id="{BA4BB51B-3CD3-4CE1-ACE4-0E3A0E4CFD3F}" type="datetimeFigureOut">
               <a:rPr lang="en-US" smtClean="0"/>
-              <a:t>1/14/2025</a:t>
+              <a:t>1/15/2025</a:t>
             </a:fld>
             <a:endParaRPr lang="en-US"/>
           </a:p>
@@ -2079,7 +2079,7 @@
           <a:p>
             <a:fld id="{BA4BB51B-3CD3-4CE1-ACE4-0E3A0E4CFD3F}" type="datetimeFigureOut">
               <a:rPr lang="en-US" smtClean="0"/>
-              <a:t>1/14/2025</a:t>
+              <a:t>1/15/2025</a:t>
             </a:fld>
             <a:endParaRPr lang="en-US"/>
           </a:p>
@@ -2390,7 +2390,7 @@
           <a:p>
             <a:fld id="{BA4BB51B-3CD3-4CE1-ACE4-0E3A0E4CFD3F}" type="datetimeFigureOut">
               <a:rPr lang="en-US" smtClean="0"/>
-              <a:t>1/14/2025</a:t>
+              <a:t>1/15/2025</a:t>
             </a:fld>
             <a:endParaRPr lang="en-US"/>
           </a:p>
@@ -2678,7 +2678,7 @@
           <a:p>
             <a:fld id="{BA4BB51B-3CD3-4CE1-ACE4-0E3A0E4CFD3F}" type="datetimeFigureOut">
               <a:rPr lang="en-US" smtClean="0"/>
-              <a:t>1/14/2025</a:t>
+              <a:t>1/15/2025</a:t>
             </a:fld>
             <a:endParaRPr lang="en-US"/>
           </a:p>
@@ -2919,7 +2919,7 @@
           <a:p>
             <a:fld id="{BA4BB51B-3CD3-4CE1-ACE4-0E3A0E4CFD3F}" type="datetimeFigureOut">
               <a:rPr lang="en-US" smtClean="0"/>
-              <a:t>1/14/2025</a:t>
+              <a:t>1/15/2025</a:t>
             </a:fld>
             <a:endParaRPr lang="en-US"/>
           </a:p>
@@ -3451,7 +3451,7 @@
         <p:spPr>
           <a:xfrm>
             <a:off x="1556078" y="2766600"/>
-            <a:ext cx="9259406" cy="1231106"/>
+            <a:ext cx="9878838" cy="1231106"/>
           </a:xfrm>
           <a:prstGeom prst="rect">
             <a:avLst/>
@@ -3474,7 +3474,31 @@
                 <a:latin typeface="Arial" panose="020B0604020202020204" pitchFamily="34" charset="0"/>
                 <a:cs typeface="Arial" panose="020B0604020202020204" pitchFamily="34" charset="0"/>
               </a:rPr>
-              <a:t>XÂY DỰNG WEBSITE GIỚI THIỆU VÀ MUA BÁN ĐẶC SẢN TRÀ VINH</a:t>
+              <a:t>XÂY DỰNG WEBSITE GIỚI THIỆU VÀ MUA BÁN ĐẶC </a:t>
+            </a:r>
+            <a:r>
+              <a:rPr lang="en-US" sz="4000" b="1" dirty="0" smtClean="0">
+                <a:solidFill>
+                  <a:schemeClr val="accent4">
+                    <a:lumMod val="50000"/>
+                  </a:schemeClr>
+                </a:solidFill>
+                <a:latin typeface="Arial" panose="020B0604020202020204" pitchFamily="34" charset="0"/>
+                <a:cs typeface="Arial" panose="020B0604020202020204" pitchFamily="34" charset="0"/>
+              </a:rPr>
+              <a:t>SẢN HAI LÚA </a:t>
+            </a:r>
+            <a:r>
+              <a:rPr lang="en-US" sz="4000" b="1" dirty="0">
+                <a:solidFill>
+                  <a:schemeClr val="accent4">
+                    <a:lumMod val="50000"/>
+                  </a:schemeClr>
+                </a:solidFill>
+                <a:latin typeface="Arial" panose="020B0604020202020204" pitchFamily="34" charset="0"/>
+                <a:cs typeface="Arial" panose="020B0604020202020204" pitchFamily="34" charset="0"/>
+              </a:rPr>
+              <a:t>TRÀ VINH</a:t>
             </a:r>
           </a:p>
         </p:txBody>
@@ -4121,7 +4145,7 @@
                 <a16:creationId xmlns:a16="http://schemas.microsoft.com/office/drawing/2014/main" id="{D009D6D5-DAC2-4A8B-A17A-E206B9012D09}"/>
               </a:ext>
               <a:ext uri="{C183D7F6-B498-43B3-948B-1728B52AA6E4}">
-                <adec:decorative xmlns:adec="http://schemas.microsoft.com/office/drawing/2017/decorative" xmlns="" val="1"/>
+                <adec:decorative xmlns="" xmlns:adec="http://schemas.microsoft.com/office/drawing/2017/decorative" val="1"/>
               </a:ext>
             </a:extLst>
           </p:cNvPr>
@@ -4939,7 +4963,7 @@
                 <a16:creationId xmlns:a16="http://schemas.microsoft.com/office/drawing/2014/main" id="{2EB492CD-616E-47F8-933B-5E2D952A0593}"/>
               </a:ext>
               <a:ext uri="{C183D7F6-B498-43B3-948B-1728B52AA6E4}">
-                <adec:decorative xmlns:adec="http://schemas.microsoft.com/office/drawing/2017/decorative" xmlns="" val="1"/>
+                <adec:decorative xmlns="" xmlns:adec="http://schemas.microsoft.com/office/drawing/2017/decorative" val="1"/>
               </a:ext>
             </a:extLst>
           </p:cNvPr>
@@ -5093,7 +5117,7 @@
                 <a16:creationId xmlns:a16="http://schemas.microsoft.com/office/drawing/2014/main" id="{59383CF9-23B5-4335-9B21-1791C4CF1C75}"/>
               </a:ext>
               <a:ext uri="{C183D7F6-B498-43B3-948B-1728B52AA6E4}">
-                <adec:decorative xmlns:adec="http://schemas.microsoft.com/office/drawing/2017/decorative" xmlns="" val="1"/>
+                <adec:decorative xmlns="" xmlns:adec="http://schemas.microsoft.com/office/drawing/2017/decorative" val="1"/>
               </a:ext>
             </a:extLst>
           </p:cNvPr>
@@ -5187,7 +5211,7 @@
                 <a16:creationId xmlns:a16="http://schemas.microsoft.com/office/drawing/2014/main" id="{0007FE00-9498-4706-B255-6437B0252C02}"/>
               </a:ext>
               <a:ext uri="{C183D7F6-B498-43B3-948B-1728B52AA6E4}">
-                <adec:decorative xmlns:adec="http://schemas.microsoft.com/office/drawing/2017/decorative" xmlns="" val="1"/>
+                <adec:decorative xmlns="" xmlns:adec="http://schemas.microsoft.com/office/drawing/2017/decorative" val="1"/>
               </a:ext>
             </a:extLst>
           </p:cNvPr>
@@ -6213,7 +6237,7 @@
                 <a16:creationId xmlns:a16="http://schemas.microsoft.com/office/drawing/2014/main" id="{2EB492CD-616E-47F8-933B-5E2D952A0593}"/>
               </a:ext>
               <a:ext uri="{C183D7F6-B498-43B3-948B-1728B52AA6E4}">
-                <adec:decorative xmlns:adec="http://schemas.microsoft.com/office/drawing/2017/decorative" xmlns="" val="1"/>
+                <adec:decorative xmlns="" xmlns:adec="http://schemas.microsoft.com/office/drawing/2017/decorative" val="1"/>
               </a:ext>
             </a:extLst>
           </p:cNvPr>
@@ -6367,7 +6391,7 @@
                 <a16:creationId xmlns:a16="http://schemas.microsoft.com/office/drawing/2014/main" id="{59383CF9-23B5-4335-9B21-1791C4CF1C75}"/>
               </a:ext>
               <a:ext uri="{C183D7F6-B498-43B3-948B-1728B52AA6E4}">
-                <adec:decorative xmlns:adec="http://schemas.microsoft.com/office/drawing/2017/decorative" xmlns="" val="1"/>
+                <adec:decorative xmlns="" xmlns:adec="http://schemas.microsoft.com/office/drawing/2017/decorative" val="1"/>
               </a:ext>
             </a:extLst>
           </p:cNvPr>
@@ -6532,7 +6556,7 @@
                 <a16:creationId xmlns:a16="http://schemas.microsoft.com/office/drawing/2014/main" id="{0007FE00-9498-4706-B255-6437B0252C02}"/>
               </a:ext>
               <a:ext uri="{C183D7F6-B498-43B3-948B-1728B52AA6E4}">
-                <adec:decorative xmlns:adec="http://schemas.microsoft.com/office/drawing/2017/decorative" xmlns="" val="1"/>
+                <adec:decorative xmlns="" xmlns:adec="http://schemas.microsoft.com/office/drawing/2017/decorative" val="1"/>
               </a:ext>
             </a:extLst>
           </p:cNvPr>
@@ -7482,7 +7506,7 @@
                 <a16:creationId xmlns:a16="http://schemas.microsoft.com/office/drawing/2014/main" id="{2EB492CD-616E-47F8-933B-5E2D952A0593}"/>
               </a:ext>
               <a:ext uri="{C183D7F6-B498-43B3-948B-1728B52AA6E4}">
-                <adec:decorative xmlns:adec="http://schemas.microsoft.com/office/drawing/2017/decorative" xmlns="" val="1"/>
+                <adec:decorative xmlns="" xmlns:adec="http://schemas.microsoft.com/office/drawing/2017/decorative" val="1"/>
               </a:ext>
             </a:extLst>
           </p:cNvPr>
@@ -7636,7 +7660,7 @@
                 <a16:creationId xmlns:a16="http://schemas.microsoft.com/office/drawing/2014/main" id="{59383CF9-23B5-4335-9B21-1791C4CF1C75}"/>
               </a:ext>
               <a:ext uri="{C183D7F6-B498-43B3-948B-1728B52AA6E4}">
-                <adec:decorative xmlns:adec="http://schemas.microsoft.com/office/drawing/2017/decorative" xmlns="" val="1"/>
+                <adec:decorative xmlns="" xmlns:adec="http://schemas.microsoft.com/office/drawing/2017/decorative" val="1"/>
               </a:ext>
             </a:extLst>
           </p:cNvPr>
@@ -7801,7 +7825,7 @@
                 <a16:creationId xmlns:a16="http://schemas.microsoft.com/office/drawing/2014/main" id="{0007FE00-9498-4706-B255-6437B0252C02}"/>
               </a:ext>
               <a:ext uri="{C183D7F6-B498-43B3-948B-1728B52AA6E4}">
-                <adec:decorative xmlns:adec="http://schemas.microsoft.com/office/drawing/2017/decorative" xmlns="" val="1"/>
+                <adec:decorative xmlns="" xmlns:adec="http://schemas.microsoft.com/office/drawing/2017/decorative" val="1"/>
               </a:ext>
             </a:extLst>
           </p:cNvPr>
@@ -8724,7 +8748,7 @@
                 <a16:creationId xmlns:a16="http://schemas.microsoft.com/office/drawing/2014/main" id="{2EB492CD-616E-47F8-933B-5E2D952A0593}"/>
               </a:ext>
               <a:ext uri="{C183D7F6-B498-43B3-948B-1728B52AA6E4}">
-                <adec:decorative xmlns:adec="http://schemas.microsoft.com/office/drawing/2017/decorative" xmlns="" val="1"/>
+                <adec:decorative xmlns="" xmlns:adec="http://schemas.microsoft.com/office/drawing/2017/decorative" val="1"/>
               </a:ext>
             </a:extLst>
           </p:cNvPr>
@@ -8878,7 +8902,7 @@
                 <a16:creationId xmlns:a16="http://schemas.microsoft.com/office/drawing/2014/main" id="{59383CF9-23B5-4335-9B21-1791C4CF1C75}"/>
               </a:ext>
               <a:ext uri="{C183D7F6-B498-43B3-948B-1728B52AA6E4}">
-                <adec:decorative xmlns:adec="http://schemas.microsoft.com/office/drawing/2017/decorative" xmlns="" val="1"/>
+                <adec:decorative xmlns="" xmlns:adec="http://schemas.microsoft.com/office/drawing/2017/decorative" val="1"/>
               </a:ext>
             </a:extLst>
           </p:cNvPr>
@@ -9032,7 +9056,7 @@
                 <a16:creationId xmlns:a16="http://schemas.microsoft.com/office/drawing/2014/main" id="{0007FE00-9498-4706-B255-6437B0252C02}"/>
               </a:ext>
               <a:ext uri="{C183D7F6-B498-43B3-948B-1728B52AA6E4}">
-                <adec:decorative xmlns:adec="http://schemas.microsoft.com/office/drawing/2017/decorative" xmlns="" val="1"/>
+                <adec:decorative xmlns="" xmlns:adec="http://schemas.microsoft.com/office/drawing/2017/decorative" val="1"/>
               </a:ext>
             </a:extLst>
           </p:cNvPr>
@@ -9405,7 +9429,7 @@
                 <a16:creationId xmlns:a16="http://schemas.microsoft.com/office/drawing/2014/main" id="{2EB492CD-616E-47F8-933B-5E2D952A0593}"/>
               </a:ext>
               <a:ext uri="{C183D7F6-B498-43B3-948B-1728B52AA6E4}">
-                <adec:decorative xmlns:adec="http://schemas.microsoft.com/office/drawing/2017/decorative" xmlns="" val="1"/>
+                <adec:decorative xmlns="" xmlns:adec="http://schemas.microsoft.com/office/drawing/2017/decorative" val="1"/>
               </a:ext>
             </a:extLst>
           </p:cNvPr>
@@ -9559,7 +9583,7 @@
                 <a16:creationId xmlns:a16="http://schemas.microsoft.com/office/drawing/2014/main" id="{59383CF9-23B5-4335-9B21-1791C4CF1C75}"/>
               </a:ext>
               <a:ext uri="{C183D7F6-B498-43B3-948B-1728B52AA6E4}">
-                <adec:decorative xmlns:adec="http://schemas.microsoft.com/office/drawing/2017/decorative" xmlns="" val="1"/>
+                <adec:decorative xmlns="" xmlns:adec="http://schemas.microsoft.com/office/drawing/2017/decorative" val="1"/>
               </a:ext>
             </a:extLst>
           </p:cNvPr>
@@ -9713,7 +9737,7 @@
                 <a16:creationId xmlns:a16="http://schemas.microsoft.com/office/drawing/2014/main" id="{0007FE00-9498-4706-B255-6437B0252C02}"/>
               </a:ext>
               <a:ext uri="{C183D7F6-B498-43B3-948B-1728B52AA6E4}">
-                <adec:decorative xmlns:adec="http://schemas.microsoft.com/office/drawing/2017/decorative" xmlns="" val="1"/>
+                <adec:decorative xmlns="" xmlns:adec="http://schemas.microsoft.com/office/drawing/2017/decorative" val="1"/>
               </a:ext>
             </a:extLst>
           </p:cNvPr>
@@ -10298,7 +10322,7 @@
                 <a16:creationId xmlns:a16="http://schemas.microsoft.com/office/drawing/2014/main" id="{2EB492CD-616E-47F8-933B-5E2D952A0593}"/>
               </a:ext>
               <a:ext uri="{C183D7F6-B498-43B3-948B-1728B52AA6E4}">
-                <adec:decorative xmlns:adec="http://schemas.microsoft.com/office/drawing/2017/decorative" xmlns="" val="1"/>
+                <adec:decorative xmlns="" xmlns:adec="http://schemas.microsoft.com/office/drawing/2017/decorative" val="1"/>
               </a:ext>
             </a:extLst>
           </p:cNvPr>
@@ -10452,7 +10476,7 @@
                 <a16:creationId xmlns:a16="http://schemas.microsoft.com/office/drawing/2014/main" id="{59383CF9-23B5-4335-9B21-1791C4CF1C75}"/>
               </a:ext>
               <a:ext uri="{C183D7F6-B498-43B3-948B-1728B52AA6E4}">
-                <adec:decorative xmlns:adec="http://schemas.microsoft.com/office/drawing/2017/decorative" xmlns="" val="1"/>
+                <adec:decorative xmlns="" xmlns:adec="http://schemas.microsoft.com/office/drawing/2017/decorative" val="1"/>
               </a:ext>
             </a:extLst>
           </p:cNvPr>
@@ -10606,7 +10630,7 @@
                 <a16:creationId xmlns:a16="http://schemas.microsoft.com/office/drawing/2014/main" id="{0007FE00-9498-4706-B255-6437B0252C02}"/>
               </a:ext>
               <a:ext uri="{C183D7F6-B498-43B3-948B-1728B52AA6E4}">
-                <adec:decorative xmlns:adec="http://schemas.microsoft.com/office/drawing/2017/decorative" xmlns="" val="1"/>
+                <adec:decorative xmlns="" xmlns:adec="http://schemas.microsoft.com/office/drawing/2017/decorative" val="1"/>
               </a:ext>
             </a:extLst>
           </p:cNvPr>
@@ -10986,7 +11010,7 @@
                 <a16:creationId xmlns:a16="http://schemas.microsoft.com/office/drawing/2014/main" id="{2EB492CD-616E-47F8-933B-5E2D952A0593}"/>
               </a:ext>
               <a:ext uri="{C183D7F6-B498-43B3-948B-1728B52AA6E4}">
-                <adec:decorative xmlns:adec="http://schemas.microsoft.com/office/drawing/2017/decorative" xmlns="" val="1"/>
+                <adec:decorative xmlns="" xmlns:adec="http://schemas.microsoft.com/office/drawing/2017/decorative" val="1"/>
               </a:ext>
             </a:extLst>
           </p:cNvPr>
@@ -11140,7 +11164,7 @@
                 <a16:creationId xmlns:a16="http://schemas.microsoft.com/office/drawing/2014/main" id="{59383CF9-23B5-4335-9B21-1791C4CF1C75}"/>
               </a:ext>
               <a:ext uri="{C183D7F6-B498-43B3-948B-1728B52AA6E4}">
-                <adec:decorative xmlns:adec="http://schemas.microsoft.com/office/drawing/2017/decorative" xmlns="" val="1"/>
+                <adec:decorative xmlns="" xmlns:adec="http://schemas.microsoft.com/office/drawing/2017/decorative" val="1"/>
               </a:ext>
             </a:extLst>
           </p:cNvPr>
@@ -11294,7 +11318,7 @@
                 <a16:creationId xmlns:a16="http://schemas.microsoft.com/office/drawing/2014/main" id="{0007FE00-9498-4706-B255-6437B0252C02}"/>
               </a:ext>
               <a:ext uri="{C183D7F6-B498-43B3-948B-1728B52AA6E4}">
-                <adec:decorative xmlns:adec="http://schemas.microsoft.com/office/drawing/2017/decorative" xmlns="" val="1"/>
+                <adec:decorative xmlns="" xmlns:adec="http://schemas.microsoft.com/office/drawing/2017/decorative" val="1"/>
               </a:ext>
             </a:extLst>
           </p:cNvPr>
@@ -11635,6 +11659,81 @@
           </a:extLst>
         </p:spPr>
       </p:pic>
+      <p:sp>
+        <p:nvSpPr>
+          <p:cNvPr id="6" name="Rounded Rectangle 5"/>
+          <p:cNvSpPr/>
+          <p:nvPr/>
+        </p:nvSpPr>
+        <p:spPr>
+          <a:xfrm>
+            <a:off x="5181600" y="1465006"/>
+            <a:ext cx="1573161" cy="403123"/>
+          </a:xfrm>
+          <a:prstGeom prst="roundRect">
+            <a:avLst/>
+          </a:prstGeom>
+        </p:spPr>
+        <p:style>
+          <a:lnRef idx="2">
+            <a:schemeClr val="dk1"/>
+          </a:lnRef>
+          <a:fillRef idx="1">
+            <a:schemeClr val="lt1"/>
+          </a:fillRef>
+          <a:effectRef idx="0">
+            <a:schemeClr val="dk1"/>
+          </a:effectRef>
+          <a:fontRef idx="minor">
+            <a:schemeClr val="dk1"/>
+          </a:fontRef>
+        </p:style>
+        <p:txBody>
+          <a:bodyPr rtlCol="0" anchor="ctr"/>
+          <a:lstStyle/>
+          <a:p>
+            <a:pPr algn="ctr"/>
+            <a:endParaRPr lang="en-US"/>
+          </a:p>
+        </p:txBody>
+      </p:sp>
+      <p:sp>
+        <p:nvSpPr>
+          <p:cNvPr id="7" name="TextBox 6"/>
+          <p:cNvSpPr txBox="1"/>
+          <p:nvPr/>
+        </p:nvSpPr>
+        <p:spPr>
+          <a:xfrm>
+            <a:off x="5260258" y="1543665"/>
+            <a:ext cx="1425677" cy="276999"/>
+          </a:xfrm>
+          <a:prstGeom prst="rect">
+            <a:avLst/>
+          </a:prstGeom>
+          <a:noFill/>
+        </p:spPr>
+        <p:txBody>
+          <a:bodyPr wrap="square" rtlCol="0">
+            <a:spAutoFit/>
+          </a:bodyPr>
+          <a:lstStyle/>
+          <a:p>
+            <a:pPr algn="ctr"/>
+            <a:r>
+              <a:rPr lang="en-US" sz="1200" dirty="0" smtClean="0">
+                <a:latin typeface="Arial" panose="020B0604020202020204" pitchFamily="34" charset="0"/>
+                <a:cs typeface="Arial" panose="020B0604020202020204" pitchFamily="34" charset="0"/>
+              </a:rPr>
+              <a:t>Website</a:t>
+            </a:r>
+            <a:endParaRPr lang="en-US" sz="1200" dirty="0">
+              <a:latin typeface="Arial" panose="020B0604020202020204" pitchFamily="34" charset="0"/>
+              <a:cs typeface="Arial" panose="020B0604020202020204" pitchFamily="34" charset="0"/>
+            </a:endParaRPr>
+          </a:p>
+        </p:txBody>
+      </p:sp>
     </p:spTree>
     <p:extLst>
       <p:ext uri="{BB962C8B-B14F-4D97-AF65-F5344CB8AC3E}">
@@ -11694,7 +11793,7 @@
                 <a16:creationId xmlns:a16="http://schemas.microsoft.com/office/drawing/2014/main" id="{2EB492CD-616E-47F8-933B-5E2D952A0593}"/>
               </a:ext>
               <a:ext uri="{C183D7F6-B498-43B3-948B-1728B52AA6E4}">
-                <adec:decorative xmlns:adec="http://schemas.microsoft.com/office/drawing/2017/decorative" xmlns="" val="1"/>
+                <adec:decorative xmlns="" xmlns:adec="http://schemas.microsoft.com/office/drawing/2017/decorative" val="1"/>
               </a:ext>
             </a:extLst>
           </p:cNvPr>
@@ -11848,7 +11947,7 @@
                 <a16:creationId xmlns:a16="http://schemas.microsoft.com/office/drawing/2014/main" id="{59383CF9-23B5-4335-9B21-1791C4CF1C75}"/>
               </a:ext>
               <a:ext uri="{C183D7F6-B498-43B3-948B-1728B52AA6E4}">
-                <adec:decorative xmlns:adec="http://schemas.microsoft.com/office/drawing/2017/decorative" xmlns="" val="1"/>
+                <adec:decorative xmlns="" xmlns:adec="http://schemas.microsoft.com/office/drawing/2017/decorative" val="1"/>
               </a:ext>
             </a:extLst>
           </p:cNvPr>
@@ -12013,7 +12112,7 @@
                 <a16:creationId xmlns:a16="http://schemas.microsoft.com/office/drawing/2014/main" id="{0007FE00-9498-4706-B255-6437B0252C02}"/>
               </a:ext>
               <a:ext uri="{C183D7F6-B498-43B3-948B-1728B52AA6E4}">
-                <adec:decorative xmlns:adec="http://schemas.microsoft.com/office/drawing/2017/decorative" xmlns="" val="1"/>
+                <adec:decorative xmlns="" xmlns:adec="http://schemas.microsoft.com/office/drawing/2017/decorative" val="1"/>
               </a:ext>
             </a:extLst>
           </p:cNvPr>

</xml_diff>